<commit_message>
Update from different Parts of Task 7
</commit_message>
<xml_diff>
--- a/doc/Task07/sequenzdiagramm.pptx
+++ b/doc/Task07/sequenzdiagramm.pptx
@@ -305,7 +305,7 @@
           <a:p>
             <a:fld id="{BA759448-4020-4154-96C5-32359420A77A}" type="datetimeFigureOut">
               <a:rPr lang="de-CH" smtClean="0"/>
-              <a:t>30.10.2015</a:t>
+              <a:t>05.11.2015</a:t>
             </a:fld>
             <a:endParaRPr lang="de-CH"/>
           </a:p>
@@ -475,7 +475,7 @@
           <a:p>
             <a:fld id="{BA759448-4020-4154-96C5-32359420A77A}" type="datetimeFigureOut">
               <a:rPr lang="de-CH" smtClean="0"/>
-              <a:t>30.10.2015</a:t>
+              <a:t>05.11.2015</a:t>
             </a:fld>
             <a:endParaRPr lang="de-CH"/>
           </a:p>
@@ -655,7 +655,7 @@
           <a:p>
             <a:fld id="{BA759448-4020-4154-96C5-32359420A77A}" type="datetimeFigureOut">
               <a:rPr lang="de-CH" smtClean="0"/>
-              <a:t>30.10.2015</a:t>
+              <a:t>05.11.2015</a:t>
             </a:fld>
             <a:endParaRPr lang="de-CH"/>
           </a:p>
@@ -825,7 +825,7 @@
           <a:p>
             <a:fld id="{BA759448-4020-4154-96C5-32359420A77A}" type="datetimeFigureOut">
               <a:rPr lang="de-CH" smtClean="0"/>
-              <a:t>30.10.2015</a:t>
+              <a:t>05.11.2015</a:t>
             </a:fld>
             <a:endParaRPr lang="de-CH"/>
           </a:p>
@@ -1071,7 +1071,7 @@
           <a:p>
             <a:fld id="{BA759448-4020-4154-96C5-32359420A77A}" type="datetimeFigureOut">
               <a:rPr lang="de-CH" smtClean="0"/>
-              <a:t>30.10.2015</a:t>
+              <a:t>05.11.2015</a:t>
             </a:fld>
             <a:endParaRPr lang="de-CH"/>
           </a:p>
@@ -1359,7 +1359,7 @@
           <a:p>
             <a:fld id="{BA759448-4020-4154-96C5-32359420A77A}" type="datetimeFigureOut">
               <a:rPr lang="de-CH" smtClean="0"/>
-              <a:t>30.10.2015</a:t>
+              <a:t>05.11.2015</a:t>
             </a:fld>
             <a:endParaRPr lang="de-CH"/>
           </a:p>
@@ -1781,7 +1781,7 @@
           <a:p>
             <a:fld id="{BA759448-4020-4154-96C5-32359420A77A}" type="datetimeFigureOut">
               <a:rPr lang="de-CH" smtClean="0"/>
-              <a:t>30.10.2015</a:t>
+              <a:t>05.11.2015</a:t>
             </a:fld>
             <a:endParaRPr lang="de-CH"/>
           </a:p>
@@ -1899,7 +1899,7 @@
           <a:p>
             <a:fld id="{BA759448-4020-4154-96C5-32359420A77A}" type="datetimeFigureOut">
               <a:rPr lang="de-CH" smtClean="0"/>
-              <a:t>30.10.2015</a:t>
+              <a:t>05.11.2015</a:t>
             </a:fld>
             <a:endParaRPr lang="de-CH"/>
           </a:p>
@@ -1994,7 +1994,7 @@
           <a:p>
             <a:fld id="{BA759448-4020-4154-96C5-32359420A77A}" type="datetimeFigureOut">
               <a:rPr lang="de-CH" smtClean="0"/>
-              <a:t>30.10.2015</a:t>
+              <a:t>05.11.2015</a:t>
             </a:fld>
             <a:endParaRPr lang="de-CH"/>
           </a:p>
@@ -2271,7 +2271,7 @@
           <a:p>
             <a:fld id="{BA759448-4020-4154-96C5-32359420A77A}" type="datetimeFigureOut">
               <a:rPr lang="de-CH" smtClean="0"/>
-              <a:t>30.10.2015</a:t>
+              <a:t>05.11.2015</a:t>
             </a:fld>
             <a:endParaRPr lang="de-CH"/>
           </a:p>
@@ -2524,7 +2524,7 @@
           <a:p>
             <a:fld id="{BA759448-4020-4154-96C5-32359420A77A}" type="datetimeFigureOut">
               <a:rPr lang="de-CH" smtClean="0"/>
-              <a:t>30.10.2015</a:t>
+              <a:t>05.11.2015</a:t>
             </a:fld>
             <a:endParaRPr lang="de-CH"/>
           </a:p>
@@ -2737,7 +2737,7 @@
           <a:p>
             <a:fld id="{BA759448-4020-4154-96C5-32359420A77A}" type="datetimeFigureOut">
               <a:rPr lang="de-CH" smtClean="0"/>
-              <a:t>30.10.2015</a:t>
+              <a:t>05.11.2015</a:t>
             </a:fld>
             <a:endParaRPr lang="de-CH"/>
           </a:p>
@@ -3908,12 +3908,32 @@
           <a:lstStyle/>
           <a:p>
             <a:r>
+              <a:rPr lang="de-CH" sz="1200" dirty="0" err="1"/>
+              <a:t>n</a:t>
+            </a:r>
+            <a:r>
+              <a:rPr lang="de-CH" sz="1200" dirty="0" err="1" smtClean="0"/>
+              <a:t>ewMeeting</a:t>
+            </a:r>
+            <a:r>
               <a:rPr lang="de-CH" sz="1200" dirty="0" smtClean="0"/>
-              <a:t>New Meeting (Date, Starttime, </a:t>
+              <a:t> (</a:t>
             </a:r>
             <a:r>
               <a:rPr lang="de-CH" sz="1200" dirty="0" err="1" smtClean="0"/>
-              <a:t>Endtime</a:t>
+              <a:t>startDate</a:t>
+            </a:r>
+            <a:r>
+              <a:rPr lang="de-CH" sz="1200" dirty="0" smtClean="0"/>
+              <a:t>, </a:t>
+            </a:r>
+            <a:r>
+              <a:rPr lang="de-CH" sz="1200" dirty="0" err="1"/>
+              <a:t>e</a:t>
+            </a:r>
+            <a:r>
+              <a:rPr lang="de-CH" sz="1200" dirty="0" err="1" smtClean="0"/>
+              <a:t>ndDate</a:t>
             </a:r>
             <a:r>
               <a:rPr lang="de-CH" sz="1200" dirty="0" smtClean="0"/>
@@ -3954,20 +3974,28 @@
           <a:lstStyle/>
           <a:p>
             <a:r>
+              <a:rPr lang="de-CH" sz="1200" dirty="0" err="1"/>
+              <a:t>v</a:t>
+            </a:r>
+            <a:r>
               <a:rPr lang="de-CH" sz="1200" dirty="0" err="1" smtClean="0"/>
-              <a:t>Verificate</a:t>
-            </a:r>
-            <a:r>
-              <a:rPr lang="de-CH" sz="1200" dirty="0" smtClean="0"/>
+              <a:t>erificate</a:t>
+            </a:r>
+            <a:r>
+              <a:rPr lang="de-CH" sz="1200" dirty="0"/>
               <a:t> (</a:t>
             </a:r>
             <a:r>
+              <a:rPr lang="de-CH" sz="1200" dirty="0" err="1"/>
+              <a:t>startDate</a:t>
+            </a:r>
+            <a:r>
               <a:rPr lang="de-CH" sz="1200" dirty="0"/>
-              <a:t>Date, Starttime, </a:t>
-            </a:r>
-            <a:r>
-              <a:rPr lang="de-CH" sz="1200" dirty="0" err="1"/>
-              <a:t>Endtime</a:t>
+              <a:t>, </a:t>
+            </a:r>
+            <a:r>
+              <a:rPr lang="de-CH" sz="1200" dirty="0" err="1" smtClean="0"/>
+              <a:t>endDate</a:t>
             </a:r>
             <a:r>
               <a:rPr lang="de-CH" sz="1200" dirty="0" smtClean="0"/>
@@ -4000,8 +4028,8 @@
           <a:lstStyle/>
           <a:p>
             <a:r>
-              <a:rPr lang="de-CH" sz="1200" dirty="0" smtClean="0"/>
-              <a:t>Meeting OK</a:t>
+              <a:rPr lang="de-CH" sz="1200" dirty="0" err="1" smtClean="0"/>
+              <a:t>true</a:t>
             </a:r>
             <a:endParaRPr lang="de-CH" sz="1200" dirty="0"/>
           </a:p>
@@ -4076,7 +4104,7 @@
         </p:nvSpPr>
         <p:spPr>
           <a:xfrm>
-            <a:off x="3268505" y="4111283"/>
+            <a:off x="3268505" y="3861048"/>
             <a:ext cx="1314402" cy="276999"/>
           </a:xfrm>
           <a:prstGeom prst="rect">
@@ -4106,7 +4134,7 @@
         </p:nvSpPr>
         <p:spPr>
           <a:xfrm>
-            <a:off x="3259110" y="3586555"/>
+            <a:off x="3268505" y="3356992"/>
             <a:ext cx="1314402" cy="276999"/>
           </a:xfrm>
           <a:prstGeom prst="rect">
@@ -4312,7 +4340,7 @@
         </p:nvCxnSpPr>
         <p:spPr>
           <a:xfrm flipH="1">
-            <a:off x="1484040" y="5373216"/>
+            <a:off x="1484040" y="5445224"/>
             <a:ext cx="1407478" cy="0"/>
           </a:xfrm>
           <a:prstGeom prst="straightConnector1">
@@ -4363,6 +4391,70 @@
             <a:r>
               <a:rPr lang="de-CH" sz="1200" dirty="0" smtClean="0"/>
               <a:t>Error (Time Error) </a:t>
+            </a:r>
+            <a:endParaRPr lang="de-CH" sz="1200" dirty="0"/>
+          </a:p>
+        </p:txBody>
+      </p:sp>
+      <p:cxnSp>
+        <p:nvCxnSpPr>
+          <p:cNvPr id="37" name="Gerade Verbindung mit Pfeil 36"/>
+          <p:cNvCxnSpPr/>
+          <p:nvPr/>
+        </p:nvCxnSpPr>
+        <p:spPr>
+          <a:xfrm flipH="1">
+            <a:off x="1475657" y="4365103"/>
+            <a:ext cx="1459248" cy="1"/>
+          </a:xfrm>
+          <a:prstGeom prst="straightConnector1">
+            <a:avLst/>
+          </a:prstGeom>
+          <a:ln>
+            <a:prstDash val="dash"/>
+            <a:tailEnd type="arrow"/>
+          </a:ln>
+        </p:spPr>
+        <p:style>
+          <a:lnRef idx="1">
+            <a:schemeClr val="accent1"/>
+          </a:lnRef>
+          <a:fillRef idx="0">
+            <a:schemeClr val="accent1"/>
+          </a:fillRef>
+          <a:effectRef idx="0">
+            <a:schemeClr val="accent1"/>
+          </a:effectRef>
+          <a:fontRef idx="minor">
+            <a:schemeClr val="tx1"/>
+          </a:fontRef>
+        </p:style>
+      </p:cxnSp>
+      <p:sp>
+        <p:nvSpPr>
+          <p:cNvPr id="40" name="Textfeld 39"/>
+          <p:cNvSpPr txBox="1"/>
+          <p:nvPr/>
+        </p:nvSpPr>
+        <p:spPr>
+          <a:xfrm>
+            <a:off x="1691680" y="4077072"/>
+            <a:ext cx="1314402" cy="276999"/>
+          </a:xfrm>
+          <a:prstGeom prst="rect">
+            <a:avLst/>
+          </a:prstGeom>
+          <a:noFill/>
+        </p:spPr>
+        <p:txBody>
+          <a:bodyPr wrap="square" rtlCol="0">
+            <a:spAutoFit/>
+          </a:bodyPr>
+          <a:lstStyle/>
+          <a:p>
+            <a:r>
+              <a:rPr lang="de-CH" sz="1200" dirty="0" err="1" smtClean="0"/>
+              <a:t>confirmation</a:t>
             </a:r>
             <a:endParaRPr lang="de-CH" sz="1200" dirty="0"/>
           </a:p>
@@ -4663,7 +4755,6 @@
               <a:rPr lang="de-CH" sz="1200" dirty="0" smtClean="0"/>
               <a:t>alert</a:t>
             </a:r>
-            <a:endParaRPr lang="de-CH" sz="1200" dirty="0" smtClean="0"/>
           </a:p>
         </p:txBody>
       </p:sp>
@@ -5180,16 +5271,24 @@
           <a:lstStyle/>
           <a:p>
             <a:r>
+              <a:rPr lang="de-CH" sz="1200" dirty="0" err="1" smtClean="0"/>
+              <a:t>m</a:t>
+            </a:r>
+            <a:r>
+              <a:rPr lang="de-CH" sz="1200" dirty="0" err="1" smtClean="0"/>
+              <a:t>eeting</a:t>
+            </a:r>
+            <a:r>
+              <a:rPr lang="de-CH" sz="1200" dirty="0" err="1" smtClean="0"/>
+              <a:t>S</a:t>
+            </a:r>
+            <a:r>
+              <a:rPr lang="de-CH" sz="1200" dirty="0" err="1" smtClean="0"/>
+              <a:t>oon</a:t>
+            </a:r>
+            <a:r>
               <a:rPr lang="de-CH" sz="1200" dirty="0" smtClean="0"/>
-              <a:t>Meeting </a:t>
-            </a:r>
-            <a:r>
-              <a:rPr lang="de-CH" sz="1200" dirty="0" err="1" smtClean="0"/>
-              <a:t>soon</a:t>
-            </a:r>
-            <a:r>
-              <a:rPr lang="de-CH" sz="1200" dirty="0" smtClean="0"/>
-              <a:t>?(Pull)</a:t>
+              <a:t>()</a:t>
             </a:r>
             <a:endParaRPr lang="de-CH" sz="1200" dirty="0"/>
           </a:p>
@@ -5203,8 +5302,8 @@
         </p:nvSpPr>
         <p:spPr>
           <a:xfrm>
-            <a:off x="5364088" y="1625529"/>
-            <a:ext cx="1505272" cy="646331"/>
+            <a:off x="5220072" y="1783849"/>
+            <a:ext cx="1872208" cy="276999"/>
           </a:xfrm>
           <a:prstGeom prst="rect">
             <a:avLst/>
@@ -5218,32 +5317,20 @@
           <a:lstStyle/>
           <a:p>
             <a:r>
+              <a:rPr lang="de-CH" sz="1200" dirty="0" err="1" smtClean="0"/>
+              <a:t>m</a:t>
+            </a:r>
+            <a:r>
+              <a:rPr lang="de-CH" sz="1200" dirty="0" err="1" smtClean="0"/>
+              <a:t>eetingShortly</a:t>
+            </a:r>
+            <a:r>
               <a:rPr lang="de-CH" sz="1200" dirty="0" smtClean="0"/>
-              <a:t>Meeting </a:t>
-            </a:r>
-            <a:r>
-              <a:rPr lang="de-CH" sz="1200" dirty="0" err="1" smtClean="0"/>
-              <a:t>soon</a:t>
+              <a:t>(</a:t>
             </a:r>
             <a:r>
               <a:rPr lang="de-CH" sz="1200" dirty="0" smtClean="0"/>
-              <a:t>? (</a:t>
-            </a:r>
-            <a:r>
-              <a:rPr lang="de-CH" sz="1200" dirty="0"/>
-              <a:t>Date, </a:t>
-            </a:r>
-            <a:r>
-              <a:rPr lang="de-CH" sz="1200" dirty="0" smtClean="0"/>
-              <a:t>Starttime, </a:t>
-            </a:r>
-            <a:r>
-              <a:rPr lang="de-CH" sz="1200" dirty="0" err="1" smtClean="0"/>
-              <a:t>actual</a:t>
-            </a:r>
-            <a:r>
-              <a:rPr lang="de-CH" sz="1200" dirty="0" smtClean="0"/>
-              <a:t> Time)</a:t>
+              <a:t>)</a:t>
             </a:r>
             <a:endParaRPr lang="de-CH" sz="1200" dirty="0"/>
           </a:p>
@@ -5257,7 +5344,7 @@
         </p:nvSpPr>
         <p:spPr>
           <a:xfrm>
-            <a:off x="3147435" y="2598620"/>
+            <a:off x="3147435" y="2626001"/>
             <a:ext cx="1505272" cy="276999"/>
           </a:xfrm>
           <a:prstGeom prst="rect">
@@ -5272,12 +5359,8 @@
           <a:lstStyle/>
           <a:p>
             <a:r>
-              <a:rPr lang="de-CH" sz="1200" dirty="0" smtClean="0"/>
-              <a:t>Meeting </a:t>
-            </a:r>
-            <a:r>
               <a:rPr lang="de-CH" sz="1200" dirty="0" err="1" smtClean="0"/>
-              <a:t>soon</a:t>
+              <a:t>true</a:t>
             </a:r>
             <a:endParaRPr lang="de-CH" sz="1200" dirty="0"/>
           </a:p>
@@ -5291,7 +5374,7 @@
         </p:nvSpPr>
         <p:spPr>
           <a:xfrm>
-            <a:off x="3244342" y="4930160"/>
+            <a:off x="3244342" y="4952201"/>
             <a:ext cx="1505272" cy="276999"/>
           </a:xfrm>
           <a:prstGeom prst="rect">
@@ -5307,11 +5390,11 @@
           <a:p>
             <a:r>
               <a:rPr lang="de-CH" sz="1200" dirty="0" err="1" smtClean="0"/>
-              <a:t>No</a:t>
+              <a:t>false</a:t>
             </a:r>
             <a:r>
               <a:rPr lang="de-CH" sz="1200" dirty="0" smtClean="0"/>
-              <a:t> Meeting () </a:t>
+              <a:t> </a:t>
             </a:r>
             <a:endParaRPr lang="de-CH" sz="1200" dirty="0"/>
           </a:p>
@@ -5372,8 +5455,12 @@
           <a:lstStyle/>
           <a:p>
             <a:r>
+              <a:rPr lang="de-CH" sz="1200" dirty="0"/>
+              <a:t>a</a:t>
+            </a:r>
+            <a:r>
               <a:rPr lang="de-CH" sz="1200" dirty="0" smtClean="0"/>
-              <a:t>Alert(</a:t>
+              <a:t>lert(</a:t>
             </a:r>
             <a:r>
               <a:rPr lang="de-CH" sz="1200" dirty="0" err="1" smtClean="0"/>
@@ -5381,7 +5468,15 @@
             </a:r>
             <a:r>
               <a:rPr lang="de-CH" sz="1200" dirty="0" smtClean="0"/>
-              <a:t>, time)</a:t>
+              <a:t>, </a:t>
+            </a:r>
+            <a:r>
+              <a:rPr lang="de-CH" sz="1200" dirty="0" err="1" smtClean="0"/>
+              <a:t>startDate</a:t>
+            </a:r>
+            <a:r>
+              <a:rPr lang="de-CH" sz="1200" dirty="0" smtClean="0"/>
+              <a:t>)</a:t>
             </a:r>
             <a:endParaRPr lang="de-CH" sz="1200" dirty="0"/>
           </a:p>

</xml_diff>